<commit_message>
Changes made to start Poland Microsimulation Model app changes
</commit_message>
<xml_diff>
--- a/microsimulation_manual/Tax Microsimulation Model - Poland.pptx
+++ b/microsimulation_manual/Tax Microsimulation Model - Poland.pptx
@@ -5,7 +5,7 @@
     <p:sldMasterId id="2147484041" r:id="rId1"/>
   </p:sldMasterIdLst>
   <p:notesMasterIdLst>
-    <p:notesMasterId r:id="rId42"/>
+    <p:notesMasterId r:id="rId43"/>
   </p:notesMasterIdLst>
   <p:sldIdLst>
     <p:sldId id="256" r:id="rId2"/>
@@ -28,26 +28,27 @@
     <p:sldId id="312" r:id="rId19"/>
     <p:sldId id="257" r:id="rId20"/>
     <p:sldId id="275" r:id="rId21"/>
-    <p:sldId id="311" r:id="rId22"/>
-    <p:sldId id="262" r:id="rId23"/>
-    <p:sldId id="263" r:id="rId24"/>
-    <p:sldId id="258" r:id="rId25"/>
-    <p:sldId id="287" r:id="rId26"/>
-    <p:sldId id="259" r:id="rId27"/>
-    <p:sldId id="265" r:id="rId28"/>
-    <p:sldId id="267" r:id="rId29"/>
-    <p:sldId id="270" r:id="rId30"/>
-    <p:sldId id="268" r:id="rId31"/>
-    <p:sldId id="269" r:id="rId32"/>
-    <p:sldId id="274" r:id="rId33"/>
-    <p:sldId id="272" r:id="rId34"/>
-    <p:sldId id="271" r:id="rId35"/>
-    <p:sldId id="260" r:id="rId36"/>
-    <p:sldId id="261" r:id="rId37"/>
-    <p:sldId id="277" r:id="rId38"/>
-    <p:sldId id="276" r:id="rId39"/>
-    <p:sldId id="264" r:id="rId40"/>
-    <p:sldId id="278" r:id="rId41"/>
+    <p:sldId id="313" r:id="rId22"/>
+    <p:sldId id="311" r:id="rId23"/>
+    <p:sldId id="262" r:id="rId24"/>
+    <p:sldId id="263" r:id="rId25"/>
+    <p:sldId id="258" r:id="rId26"/>
+    <p:sldId id="287" r:id="rId27"/>
+    <p:sldId id="259" r:id="rId28"/>
+    <p:sldId id="265" r:id="rId29"/>
+    <p:sldId id="267" r:id="rId30"/>
+    <p:sldId id="270" r:id="rId31"/>
+    <p:sldId id="268" r:id="rId32"/>
+    <p:sldId id="269" r:id="rId33"/>
+    <p:sldId id="274" r:id="rId34"/>
+    <p:sldId id="272" r:id="rId35"/>
+    <p:sldId id="271" r:id="rId36"/>
+    <p:sldId id="260" r:id="rId37"/>
+    <p:sldId id="261" r:id="rId38"/>
+    <p:sldId id="277" r:id="rId39"/>
+    <p:sldId id="276" r:id="rId40"/>
+    <p:sldId id="264" r:id="rId41"/>
+    <p:sldId id="278" r:id="rId42"/>
   </p:sldIdLst>
   <p:sldSz cx="12192000" cy="6858000"/>
   <p:notesSz cx="6858000" cy="9144000"/>
@@ -175,6 +176,7 @@
           <p14:sldIdLst>
             <p14:sldId id="257"/>
             <p14:sldId id="275"/>
+            <p14:sldId id="313"/>
             <p14:sldId id="311"/>
             <p14:sldId id="262"/>
             <p14:sldId id="263"/>
@@ -11337,7 +11339,7 @@
           <a:p>
             <a:fld id="{CE18CD78-0727-4E59-8DC5-77E825CD074D}" type="datetimeFigureOut">
               <a:rPr lang="en-US" smtClean="0"/>
-              <a:t>1/29/2020</a:t>
+              <a:t>2/24/2020</a:t>
             </a:fld>
             <a:endParaRPr lang="en-US"/>
           </a:p>
@@ -11751,7 +11753,7 @@
           <a:p>
             <a:fld id="{41EE8611-A651-4149-87AB-284BA6E7A909}" type="datetime1">
               <a:rPr lang="en-US" smtClean="0"/>
-              <a:t>1/29/2020</a:t>
+              <a:t>2/24/2020</a:t>
             </a:fld>
             <a:endParaRPr lang="en-US"/>
           </a:p>
@@ -11954,7 +11956,7 @@
           <a:p>
             <a:fld id="{287A6877-944E-4106-A636-12A3BCA8DFA8}" type="datetime1">
               <a:rPr lang="en-US" smtClean="0"/>
-              <a:t>1/29/2020</a:t>
+              <a:t>2/24/2020</a:t>
             </a:fld>
             <a:endParaRPr lang="en-US"/>
           </a:p>
@@ -12163,7 +12165,7 @@
           <a:p>
             <a:fld id="{287A6877-944E-4106-A636-12A3BCA8DFA8}" type="datetime1">
               <a:rPr lang="en-US" smtClean="0"/>
-              <a:t>1/29/2020</a:t>
+              <a:t>2/24/2020</a:t>
             </a:fld>
             <a:endParaRPr lang="en-US"/>
           </a:p>
@@ -12351,7 +12353,7 @@
           <a:p>
             <a:fld id="{287A6877-944E-4106-A636-12A3BCA8DFA8}" type="datetime1">
               <a:rPr lang="en-US" smtClean="0"/>
-              <a:t>1/29/2020</a:t>
+              <a:t>2/24/2020</a:t>
             </a:fld>
             <a:endParaRPr lang="en-US"/>
           </a:p>
@@ -12898,7 +12900,7 @@
           <a:p>
             <a:fld id="{287A6877-944E-4106-A636-12A3BCA8DFA8}" type="datetime1">
               <a:rPr lang="en-US" smtClean="0"/>
-              <a:t>1/29/2020</a:t>
+              <a:t>2/24/2020</a:t>
             </a:fld>
             <a:endParaRPr lang="en-US"/>
           </a:p>
@@ -13085,7 +13087,7 @@
           <a:p>
             <a:fld id="{287A6877-944E-4106-A636-12A3BCA8DFA8}" type="datetime1">
               <a:rPr lang="en-US" smtClean="0"/>
-              <a:t>1/29/2020</a:t>
+              <a:t>2/24/2020</a:t>
             </a:fld>
             <a:endParaRPr lang="en-US"/>
           </a:p>
@@ -13361,7 +13363,7 @@
           <a:p>
             <a:fld id="{8781108C-BDF0-457E-96E8-FAFF6C4F082A}" type="datetime1">
               <a:rPr lang="en-US" smtClean="0"/>
-              <a:t>1/29/2020</a:t>
+              <a:t>2/24/2020</a:t>
             </a:fld>
             <a:endParaRPr lang="en-US"/>
           </a:p>
@@ -13626,7 +13628,7 @@
           <a:p>
             <a:fld id="{287A6877-944E-4106-A636-12A3BCA8DFA8}" type="datetime1">
               <a:rPr lang="en-US" smtClean="0"/>
-              <a:t>1/29/2020</a:t>
+              <a:t>2/24/2020</a:t>
             </a:fld>
             <a:endParaRPr lang="en-US"/>
           </a:p>
@@ -14039,7 +14041,7 @@
           <a:p>
             <a:fld id="{287A6877-944E-4106-A636-12A3BCA8DFA8}" type="datetime1">
               <a:rPr lang="en-US" smtClean="0"/>
-              <a:t>1/29/2020</a:t>
+              <a:t>2/24/2020</a:t>
             </a:fld>
             <a:endParaRPr lang="en-US"/>
           </a:p>
@@ -14181,7 +14183,7 @@
           <a:p>
             <a:fld id="{1AB0C280-1237-43FD-B5FD-0D518887BCDE}" type="datetime1">
               <a:rPr lang="en-US" smtClean="0"/>
-              <a:t>1/29/2020</a:t>
+              <a:t>2/24/2020</a:t>
             </a:fld>
             <a:endParaRPr lang="en-US"/>
           </a:p>
@@ -14294,7 +14296,7 @@
           <a:p>
             <a:fld id="{F604843D-B900-4D1C-A5B9-DEF8B6803C42}" type="datetime1">
               <a:rPr lang="en-US" smtClean="0"/>
-              <a:t>1/29/2020</a:t>
+              <a:t>2/24/2020</a:t>
             </a:fld>
             <a:endParaRPr lang="en-US"/>
           </a:p>
@@ -14610,7 +14612,7 @@
           <a:p>
             <a:fld id="{287A6877-944E-4106-A636-12A3BCA8DFA8}" type="datetime1">
               <a:rPr lang="en-US" smtClean="0"/>
-              <a:t>1/29/2020</a:t>
+              <a:t>2/24/2020</a:t>
             </a:fld>
             <a:endParaRPr lang="en-US"/>
           </a:p>
@@ -14899,7 +14901,7 @@
           <a:p>
             <a:fld id="{4C38CDF8-8721-480C-92AC-F3AF90708938}" type="datetime1">
               <a:rPr lang="en-US" smtClean="0"/>
-              <a:t>1/29/2020</a:t>
+              <a:t>2/24/2020</a:t>
             </a:fld>
             <a:endParaRPr lang="en-US"/>
           </a:p>
@@ -15140,7 +15142,7 @@
           <a:p>
             <a:fld id="{287A6877-944E-4106-A636-12A3BCA8DFA8}" type="datetime1">
               <a:rPr lang="en-US" smtClean="0"/>
-              <a:t>1/29/2020</a:t>
+              <a:t>2/24/2020</a:t>
             </a:fld>
             <a:endParaRPr lang="en-US"/>
           </a:p>
@@ -17919,6 +17921,200 @@
           <p:cNvPr id="2" name="Title 1">
             <a:extLst>
               <a:ext uri="{FF2B5EF4-FFF2-40B4-BE49-F238E27FC236}">
+                <a16:creationId xmlns:a16="http://schemas.microsoft.com/office/drawing/2014/main" id="{C1F5BEAD-5CBD-418D-BDA8-5991678B26A2}"/>
+              </a:ext>
+            </a:extLst>
+          </p:cNvPr>
+          <p:cNvSpPr>
+            <a:spLocks noGrp="1"/>
+          </p:cNvSpPr>
+          <p:nvPr>
+            <p:ph type="title"/>
+          </p:nvPr>
+        </p:nvSpPr>
+        <p:spPr/>
+        <p:txBody>
+          <a:bodyPr/>
+          <a:lstStyle/>
+          <a:p>
+            <a:r>
+              <a:rPr lang="en-US" dirty="0"/>
+              <a:t>Day1 tasks</a:t>
+            </a:r>
+          </a:p>
+        </p:txBody>
+      </p:sp>
+      <p:sp>
+        <p:nvSpPr>
+          <p:cNvPr id="3" name="Content Placeholder 2">
+            <a:extLst>
+              <a:ext uri="{FF2B5EF4-FFF2-40B4-BE49-F238E27FC236}">
+                <a16:creationId xmlns:a16="http://schemas.microsoft.com/office/drawing/2014/main" id="{013D0E9B-0707-4DB7-A078-66DD27606EDE}"/>
+              </a:ext>
+            </a:extLst>
+          </p:cNvPr>
+          <p:cNvSpPr>
+            <a:spLocks noGrp="1"/>
+          </p:cNvSpPr>
+          <p:nvPr>
+            <p:ph idx="1"/>
+          </p:nvPr>
+        </p:nvSpPr>
+        <p:spPr/>
+        <p:txBody>
+          <a:bodyPr/>
+          <a:lstStyle/>
+          <a:p>
+            <a:r>
+              <a:rPr lang="en-US" dirty="0"/>
+              <a:t>Setup the software</a:t>
+            </a:r>
+          </a:p>
+          <a:p>
+            <a:r>
+              <a:rPr lang="en-US" dirty="0"/>
+              <a:t>Import the cit_poland.csv data into records.py</a:t>
+            </a:r>
+          </a:p>
+          <a:p>
+            <a:r>
+              <a:rPr lang="en-US" dirty="0"/>
+              <a:t>Import the </a:t>
+            </a:r>
+            <a:r>
+              <a:rPr lang="en-US" dirty="0" err="1"/>
+              <a:t>cit_weights_Poland</a:t>
+            </a:r>
+            <a:r>
+              <a:rPr lang="en-US" dirty="0"/>
+              <a:t> data into records.py</a:t>
+            </a:r>
+          </a:p>
+          <a:p>
+            <a:r>
+              <a:rPr lang="en-US" dirty="0"/>
+              <a:t>Build the </a:t>
+            </a:r>
+            <a:r>
+              <a:rPr lang="en-US" dirty="0" err="1"/>
+              <a:t>corprecords_variable_poland.json</a:t>
+            </a:r>
+            <a:r>
+              <a:rPr lang="en-US" dirty="0"/>
+              <a:t> file</a:t>
+            </a:r>
+          </a:p>
+          <a:p>
+            <a:r>
+              <a:rPr lang="en-US" dirty="0"/>
+              <a:t>Build the </a:t>
+            </a:r>
+            <a:r>
+              <a:rPr lang="en-US" dirty="0" err="1"/>
+              <a:t>current_law_policy_poland.json</a:t>
+            </a:r>
+            <a:r>
+              <a:rPr lang="en-US" dirty="0"/>
+              <a:t> file</a:t>
+            </a:r>
+          </a:p>
+          <a:p>
+            <a:r>
+              <a:rPr lang="en-US" dirty="0"/>
+              <a:t>Import the </a:t>
+            </a:r>
+            <a:r>
+              <a:rPr lang="en-US" dirty="0" err="1"/>
+              <a:t>current_law_policy_poland.json</a:t>
+            </a:r>
+            <a:r>
+              <a:rPr lang="en-US" dirty="0"/>
+              <a:t> file into policy.py</a:t>
+            </a:r>
+          </a:p>
+          <a:p>
+            <a:r>
+              <a:rPr lang="en-US" dirty="0"/>
+              <a:t>Incorporate </a:t>
+            </a:r>
+            <a:r>
+              <a:rPr lang="en-US" dirty="0" err="1"/>
+              <a:t>growfactors</a:t>
+            </a:r>
+            <a:endParaRPr lang="en-US" dirty="0"/>
+          </a:p>
+          <a:p>
+            <a:r>
+              <a:rPr lang="en-US" dirty="0"/>
+              <a:t>Write a short function to calculate the CIT</a:t>
+            </a:r>
+          </a:p>
+        </p:txBody>
+      </p:sp>
+      <p:sp>
+        <p:nvSpPr>
+          <p:cNvPr id="4" name="Slide Number Placeholder 3">
+            <a:extLst>
+              <a:ext uri="{FF2B5EF4-FFF2-40B4-BE49-F238E27FC236}">
+                <a16:creationId xmlns:a16="http://schemas.microsoft.com/office/drawing/2014/main" id="{3FE5E8F5-0D3A-4C19-AE03-3501C442397A}"/>
+              </a:ext>
+            </a:extLst>
+          </p:cNvPr>
+          <p:cNvSpPr>
+            <a:spLocks noGrp="1"/>
+          </p:cNvSpPr>
+          <p:nvPr>
+            <p:ph type="sldNum" sz="quarter" idx="12"/>
+          </p:nvPr>
+        </p:nvSpPr>
+        <p:spPr/>
+        <p:txBody>
+          <a:bodyPr/>
+          <a:lstStyle/>
+          <a:p>
+            <a:fld id="{52C44A77-5F5E-4CB9-8D56-F5EB4797E63D}" type="slidenum">
+              <a:rPr lang="en-US" smtClean="0"/>
+              <a:t>21</a:t>
+            </a:fld>
+            <a:endParaRPr lang="en-US"/>
+          </a:p>
+        </p:txBody>
+      </p:sp>
+    </p:spTree>
+    <p:extLst>
+      <p:ext uri="{BB962C8B-B14F-4D97-AF65-F5344CB8AC3E}">
+        <p14:creationId xmlns:p14="http://schemas.microsoft.com/office/powerpoint/2010/main" val="3410754786"/>
+      </p:ext>
+    </p:extLst>
+  </p:cSld>
+  <p:clrMapOvr>
+    <a:masterClrMapping/>
+  </p:clrMapOvr>
+</p:sld>
+</file>
+
+<file path=ppt/slides/slide22.xml><?xml version="1.0" encoding="utf-8"?>
+<p:sld xmlns:a="http://schemas.openxmlformats.org/drawingml/2006/main" xmlns:r="http://schemas.openxmlformats.org/officeDocument/2006/relationships" xmlns:p="http://schemas.openxmlformats.org/presentationml/2006/main">
+  <p:cSld>
+    <p:spTree>
+      <p:nvGrpSpPr>
+        <p:cNvPr id="1" name=""/>
+        <p:cNvGrpSpPr/>
+        <p:nvPr/>
+      </p:nvGrpSpPr>
+      <p:grpSpPr>
+        <a:xfrm>
+          <a:off x="0" y="0"/>
+          <a:ext cx="0" cy="0"/>
+          <a:chOff x="0" y="0"/>
+          <a:chExt cx="0" cy="0"/>
+        </a:xfrm>
+      </p:grpSpPr>
+      <p:sp>
+        <p:nvSpPr>
+          <p:cNvPr id="2" name="Title 1">
+            <a:extLst>
+              <a:ext uri="{FF2B5EF4-FFF2-40B4-BE49-F238E27FC236}">
                 <a16:creationId xmlns:a16="http://schemas.microsoft.com/office/drawing/2014/main" id="{DB3E4FB6-5224-4900-AFE8-EAABE9BA0E70}"/>
               </a:ext>
             </a:extLst>
@@ -17990,7 +18186,7 @@
           <a:p>
             <a:fld id="{52C44A77-5F5E-4CB9-8D56-F5EB4797E63D}" type="slidenum">
               <a:rPr lang="en-US" smtClean="0"/>
-              <a:t>21</a:t>
+              <a:t>22</a:t>
             </a:fld>
             <a:endParaRPr lang="en-US"/>
           </a:p>
@@ -18069,7 +18265,7 @@
 </p:sld>
 </file>
 
-<file path=ppt/slides/slide22.xml><?xml version="1.0" encoding="utf-8"?>
+<file path=ppt/slides/slide23.xml><?xml version="1.0" encoding="utf-8"?>
 <p:sld xmlns:a="http://schemas.openxmlformats.org/drawingml/2006/main" xmlns:r="http://schemas.openxmlformats.org/officeDocument/2006/relationships" xmlns:p="http://schemas.openxmlformats.org/presentationml/2006/main">
   <p:cSld>
     <p:spTree>
@@ -18228,7 +18424,7 @@
 </p:sld>
 </file>
 
-<file path=ppt/slides/slide23.xml><?xml version="1.0" encoding="utf-8"?>
+<file path=ppt/slides/slide24.xml><?xml version="1.0" encoding="utf-8"?>
 <p:sld xmlns:a="http://schemas.openxmlformats.org/drawingml/2006/main" xmlns:r="http://schemas.openxmlformats.org/officeDocument/2006/relationships" xmlns:p="http://schemas.openxmlformats.org/presentationml/2006/main">
   <p:cSld>
     <p:spTree>
@@ -18398,7 +18594,7 @@
 </p:sld>
 </file>
 
-<file path=ppt/slides/slide24.xml><?xml version="1.0" encoding="utf-8"?>
+<file path=ppt/slides/slide25.xml><?xml version="1.0" encoding="utf-8"?>
 <p:sld xmlns:a="http://schemas.openxmlformats.org/drawingml/2006/main" xmlns:r="http://schemas.openxmlformats.org/officeDocument/2006/relationships" xmlns:p="http://schemas.openxmlformats.org/presentationml/2006/main">
   <p:cSld>
     <p:spTree>
@@ -18569,7 +18765,7 @@
 </p:sld>
 </file>
 
-<file path=ppt/slides/slide25.xml><?xml version="1.0" encoding="utf-8"?>
+<file path=ppt/slides/slide26.xml><?xml version="1.0" encoding="utf-8"?>
 <p:sld xmlns:a="http://schemas.openxmlformats.org/drawingml/2006/main" xmlns:r="http://schemas.openxmlformats.org/officeDocument/2006/relationships" xmlns:p="http://schemas.openxmlformats.org/presentationml/2006/main">
   <p:cSld>
     <p:spTree>
@@ -19094,7 +19290,7 @@
 </p:sld>
 </file>
 
-<file path=ppt/slides/slide26.xml><?xml version="1.0" encoding="utf-8"?>
+<file path=ppt/slides/slide27.xml><?xml version="1.0" encoding="utf-8"?>
 <p:sld xmlns:a="http://schemas.openxmlformats.org/drawingml/2006/main" xmlns:r="http://schemas.openxmlformats.org/officeDocument/2006/relationships" xmlns:p="http://schemas.openxmlformats.org/presentationml/2006/main">
   <p:cSld>
     <p:spTree>
@@ -19222,7 +19418,7 @@
 </p:sld>
 </file>
 
-<file path=ppt/slides/slide27.xml><?xml version="1.0" encoding="utf-8"?>
+<file path=ppt/slides/slide28.xml><?xml version="1.0" encoding="utf-8"?>
 <p:sld xmlns:a="http://schemas.openxmlformats.org/drawingml/2006/main" xmlns:r="http://schemas.openxmlformats.org/officeDocument/2006/relationships" xmlns:p="http://schemas.openxmlformats.org/presentationml/2006/main">
   <p:cSld>
     <p:spTree>
@@ -19338,7 +19534,7 @@
 </p:sld>
 </file>
 
-<file path=ppt/slides/slide28.xml><?xml version="1.0" encoding="utf-8"?>
+<file path=ppt/slides/slide29.xml><?xml version="1.0" encoding="utf-8"?>
 <p:sld xmlns:a="http://schemas.openxmlformats.org/drawingml/2006/main" xmlns:r="http://schemas.openxmlformats.org/officeDocument/2006/relationships" xmlns:p="http://schemas.openxmlformats.org/presentationml/2006/main">
   <p:cSld>
     <p:spTree>
@@ -19726,353 +19922,6 @@
     <p:extLst>
       <p:ext uri="{BB962C8B-B14F-4D97-AF65-F5344CB8AC3E}">
         <p14:creationId xmlns:p14="http://schemas.microsoft.com/office/powerpoint/2010/main" val="3007201000"/>
-      </p:ext>
-    </p:extLst>
-  </p:cSld>
-  <p:clrMapOvr>
-    <a:masterClrMapping/>
-  </p:clrMapOvr>
-</p:sld>
-</file>
-
-<file path=ppt/slides/slide29.xml><?xml version="1.0" encoding="utf-8"?>
-<p:sld xmlns:a="http://schemas.openxmlformats.org/drawingml/2006/main" xmlns:r="http://schemas.openxmlformats.org/officeDocument/2006/relationships" xmlns:p="http://schemas.openxmlformats.org/presentationml/2006/main">
-  <p:cSld>
-    <p:spTree>
-      <p:nvGrpSpPr>
-        <p:cNvPr id="1" name=""/>
-        <p:cNvGrpSpPr/>
-        <p:nvPr/>
-      </p:nvGrpSpPr>
-      <p:grpSpPr>
-        <a:xfrm>
-          <a:off x="0" y="0"/>
-          <a:ext cx="0" cy="0"/>
-          <a:chOff x="0" y="0"/>
-          <a:chExt cx="0" cy="0"/>
-        </a:xfrm>
-      </p:grpSpPr>
-      <p:sp>
-        <p:nvSpPr>
-          <p:cNvPr id="2" name="Title 1">
-            <a:extLst>
-              <a:ext uri="{FF2B5EF4-FFF2-40B4-BE49-F238E27FC236}">
-                <a16:creationId xmlns:a16="http://schemas.microsoft.com/office/drawing/2014/main" id="{854EA74E-3EB5-4F66-B2EF-A3E94CFA26EE}"/>
-              </a:ext>
-            </a:extLst>
-          </p:cNvPr>
-          <p:cNvSpPr>
-            <a:spLocks noGrp="1"/>
-          </p:cNvSpPr>
-          <p:nvPr>
-            <p:ph type="title"/>
-          </p:nvPr>
-        </p:nvSpPr>
-        <p:spPr>
-          <a:xfrm>
-            <a:off x="838200" y="212725"/>
-            <a:ext cx="10515600" cy="781885"/>
-          </a:xfrm>
-        </p:spPr>
-        <p:txBody>
-          <a:bodyPr>
-            <a:normAutofit/>
-          </a:bodyPr>
-          <a:lstStyle/>
-          <a:p>
-            <a:r>
-              <a:rPr lang="en-US" sz="3200" dirty="0"/>
-              <a:t>Adding a new tax function (3)</a:t>
-            </a:r>
-          </a:p>
-        </p:txBody>
-      </p:sp>
-      <p:sp>
-        <p:nvSpPr>
-          <p:cNvPr id="3" name="Content Placeholder 2">
-            <a:extLst>
-              <a:ext uri="{FF2B5EF4-FFF2-40B4-BE49-F238E27FC236}">
-                <a16:creationId xmlns:a16="http://schemas.microsoft.com/office/drawing/2014/main" id="{D4AB1FC9-D5D0-47B6-B0D8-8E05DE7437CE}"/>
-              </a:ext>
-            </a:extLst>
-          </p:cNvPr>
-          <p:cNvSpPr>
-            <a:spLocks noGrp="1"/>
-          </p:cNvSpPr>
-          <p:nvPr>
-            <p:ph idx="1"/>
-          </p:nvPr>
-        </p:nvSpPr>
-        <p:spPr>
-          <a:xfrm>
-            <a:off x="838200" y="994611"/>
-            <a:ext cx="10515600" cy="5182352"/>
-          </a:xfrm>
-        </p:spPr>
-        <p:txBody>
-          <a:bodyPr/>
-          <a:lstStyle/>
-          <a:p>
-            <a:r>
-              <a:rPr lang="en-US" sz="2000" dirty="0"/>
-              <a:t>Connect the new function with the calculator.</a:t>
-            </a:r>
-          </a:p>
-          <a:p>
-            <a:r>
-              <a:rPr lang="en-US" sz="2000" dirty="0"/>
-              <a:t>This is done by updating </a:t>
-            </a:r>
-            <a:r>
-              <a:rPr lang="en-US" sz="2000" b="1" dirty="0"/>
-              <a:t>calculator.py </a:t>
-            </a:r>
-            <a:r>
-              <a:rPr lang="en-US" sz="2000" dirty="0"/>
-              <a:t>in two places.</a:t>
-            </a:r>
-          </a:p>
-          <a:p>
-            <a:pPr lvl="1"/>
-            <a:r>
-              <a:rPr lang="en-US" dirty="0"/>
-              <a:t>At the beginning where we import it and,</a:t>
-            </a:r>
-          </a:p>
-          <a:p>
-            <a:pPr lvl="1"/>
-            <a:r>
-              <a:rPr lang="en-US" dirty="0"/>
-              <a:t>In </a:t>
-            </a:r>
-            <a:r>
-              <a:rPr lang="en-US" dirty="0" err="1"/>
-              <a:t>calc_all</a:t>
-            </a:r>
-            <a:r>
-              <a:rPr lang="en-US" dirty="0"/>
-              <a:t> function where we call the function. </a:t>
-            </a:r>
-          </a:p>
-        </p:txBody>
-      </p:sp>
-      <p:pic>
-        <p:nvPicPr>
-          <p:cNvPr id="4" name="Picture 3">
-            <a:extLst>
-              <a:ext uri="{FF2B5EF4-FFF2-40B4-BE49-F238E27FC236}">
-                <a16:creationId xmlns:a16="http://schemas.microsoft.com/office/drawing/2014/main" id="{64F7468D-23E2-48B7-A0EC-DC83030AE4EE}"/>
-              </a:ext>
-            </a:extLst>
-          </p:cNvPr>
-          <p:cNvPicPr/>
-          <p:nvPr/>
-        </p:nvPicPr>
-        <p:blipFill>
-          <a:blip r:embed="rId2"/>
-          <a:stretch>
-            <a:fillRect/>
-          </a:stretch>
-        </p:blipFill>
-        <p:spPr>
-          <a:xfrm>
-            <a:off x="1640307" y="2663238"/>
-            <a:ext cx="4665243" cy="3513724"/>
-          </a:xfrm>
-          <a:prstGeom prst="rect">
-            <a:avLst/>
-          </a:prstGeom>
-        </p:spPr>
-      </p:pic>
-      <p:pic>
-        <p:nvPicPr>
-          <p:cNvPr id="5" name="Picture 4">
-            <a:extLst>
-              <a:ext uri="{FF2B5EF4-FFF2-40B4-BE49-F238E27FC236}">
-                <a16:creationId xmlns:a16="http://schemas.microsoft.com/office/drawing/2014/main" id="{842D2896-C241-4B64-9F15-5DA3ABBC1AE2}"/>
-              </a:ext>
-            </a:extLst>
-          </p:cNvPr>
-          <p:cNvPicPr/>
-          <p:nvPr/>
-        </p:nvPicPr>
-        <p:blipFill>
-          <a:blip r:embed="rId3"/>
-          <a:stretch>
-            <a:fillRect/>
-          </a:stretch>
-        </p:blipFill>
-        <p:spPr>
-          <a:xfrm>
-            <a:off x="7796464" y="1032627"/>
-            <a:ext cx="3958390" cy="5144335"/>
-          </a:xfrm>
-          <a:prstGeom prst="rect">
-            <a:avLst/>
-          </a:prstGeom>
-        </p:spPr>
-      </p:pic>
-      <p:sp>
-        <p:nvSpPr>
-          <p:cNvPr id="6" name="TextBox 5">
-            <a:extLst>
-              <a:ext uri="{FF2B5EF4-FFF2-40B4-BE49-F238E27FC236}">
-                <a16:creationId xmlns:a16="http://schemas.microsoft.com/office/drawing/2014/main" id="{194B03CD-8EFB-40CA-AEC3-620F36956DD7}"/>
-              </a:ext>
-            </a:extLst>
-          </p:cNvPr>
-          <p:cNvSpPr txBox="1"/>
-          <p:nvPr/>
-        </p:nvSpPr>
-        <p:spPr>
-          <a:xfrm>
-            <a:off x="561474" y="6304549"/>
-            <a:ext cx="10515600" cy="584775"/>
-          </a:xfrm>
-          <a:prstGeom prst="rect">
-            <a:avLst/>
-          </a:prstGeom>
-          <a:noFill/>
-        </p:spPr>
-        <p:txBody>
-          <a:bodyPr wrap="square" rtlCol="0">
-            <a:spAutoFit/>
-          </a:bodyPr>
-          <a:lstStyle/>
-          <a:p>
-            <a:r>
-              <a:rPr lang="en-US" sz="1600" b="1" dirty="0"/>
-              <a:t>Note:</a:t>
-            </a:r>
-            <a:r>
-              <a:rPr lang="en-US" sz="1600" dirty="0"/>
-              <a:t> The declaration in </a:t>
-            </a:r>
-            <a:r>
-              <a:rPr lang="en-US" sz="1600" dirty="0" err="1"/>
-              <a:t>calc_all</a:t>
-            </a:r>
-            <a:r>
-              <a:rPr lang="en-US" sz="1600" dirty="0"/>
-              <a:t> function looks for “</a:t>
-            </a:r>
-            <a:r>
-              <a:rPr lang="en-US" sz="1600" dirty="0" err="1"/>
-              <a:t>self.__policy</a:t>
-            </a:r>
-            <a:r>
-              <a:rPr lang="en-US" sz="1600" dirty="0"/>
-              <a:t>” variables and “</a:t>
-            </a:r>
-            <a:r>
-              <a:rPr lang="en-US" sz="1600" dirty="0" err="1"/>
-              <a:t>self.__records</a:t>
-            </a:r>
-            <a:r>
-              <a:rPr lang="en-US" sz="1600" dirty="0"/>
-              <a:t>” variables hence the order of the input variables declared in the functions.py has to be in the same order – policy and then record variables.</a:t>
-            </a:r>
-          </a:p>
-        </p:txBody>
-      </p:sp>
-      <p:sp>
-        <p:nvSpPr>
-          <p:cNvPr id="8" name="Oval 7">
-            <a:extLst>
-              <a:ext uri="{FF2B5EF4-FFF2-40B4-BE49-F238E27FC236}">
-                <a16:creationId xmlns:a16="http://schemas.microsoft.com/office/drawing/2014/main" id="{419D10E6-B588-4359-8BE9-672D180821E2}"/>
-              </a:ext>
-            </a:extLst>
-          </p:cNvPr>
-          <p:cNvSpPr/>
-          <p:nvPr/>
-        </p:nvSpPr>
-        <p:spPr>
-          <a:xfrm>
-            <a:off x="4523873" y="3487153"/>
-            <a:ext cx="1780674" cy="324853"/>
-          </a:xfrm>
-          <a:prstGeom prst="ellipse">
-            <a:avLst/>
-          </a:prstGeom>
-          <a:noFill/>
-        </p:spPr>
-        <p:style>
-          <a:lnRef idx="2">
-            <a:schemeClr val="accent1">
-              <a:shade val="50000"/>
-            </a:schemeClr>
-          </a:lnRef>
-          <a:fillRef idx="1">
-            <a:schemeClr val="accent1"/>
-          </a:fillRef>
-          <a:effectRef idx="0">
-            <a:schemeClr val="accent1"/>
-          </a:effectRef>
-          <a:fontRef idx="minor">
-            <a:schemeClr val="lt1"/>
-          </a:fontRef>
-        </p:style>
-        <p:txBody>
-          <a:bodyPr rtlCol="0" anchor="ctr"/>
-          <a:lstStyle/>
-          <a:p>
-            <a:pPr algn="ctr"/>
-            <a:endParaRPr lang="en-US"/>
-          </a:p>
-        </p:txBody>
-      </p:sp>
-      <p:sp>
-        <p:nvSpPr>
-          <p:cNvPr id="9" name="Oval 8">
-            <a:extLst>
-              <a:ext uri="{FF2B5EF4-FFF2-40B4-BE49-F238E27FC236}">
-                <a16:creationId xmlns:a16="http://schemas.microsoft.com/office/drawing/2014/main" id="{193812AB-0966-47D7-A41F-3754721E60E7}"/>
-              </a:ext>
-            </a:extLst>
-          </p:cNvPr>
-          <p:cNvSpPr/>
-          <p:nvPr/>
-        </p:nvSpPr>
-        <p:spPr>
-          <a:xfrm>
-            <a:off x="7395411" y="4420100"/>
-            <a:ext cx="3958389" cy="322848"/>
-          </a:xfrm>
-          <a:prstGeom prst="ellipse">
-            <a:avLst/>
-          </a:prstGeom>
-          <a:noFill/>
-        </p:spPr>
-        <p:style>
-          <a:lnRef idx="2">
-            <a:schemeClr val="accent1">
-              <a:shade val="50000"/>
-            </a:schemeClr>
-          </a:lnRef>
-          <a:fillRef idx="1">
-            <a:schemeClr val="accent1"/>
-          </a:fillRef>
-          <a:effectRef idx="0">
-            <a:schemeClr val="accent1"/>
-          </a:effectRef>
-          <a:fontRef idx="minor">
-            <a:schemeClr val="lt1"/>
-          </a:fontRef>
-        </p:style>
-        <p:txBody>
-          <a:bodyPr rtlCol="0" anchor="ctr"/>
-          <a:lstStyle/>
-          <a:p>
-            <a:pPr algn="ctr"/>
-            <a:endParaRPr lang="en-US"/>
-          </a:p>
-        </p:txBody>
-      </p:sp>
-    </p:spTree>
-    <p:extLst>
-      <p:ext uri="{BB962C8B-B14F-4D97-AF65-F5344CB8AC3E}">
-        <p14:creationId xmlns:p14="http://schemas.microsoft.com/office/powerpoint/2010/main" val="1313210503"/>
       </p:ext>
     </p:extLst>
   </p:cSld>
@@ -20321,6 +20170,353 @@
           <p:cNvPr id="2" name="Title 1">
             <a:extLst>
               <a:ext uri="{FF2B5EF4-FFF2-40B4-BE49-F238E27FC236}">
+                <a16:creationId xmlns:a16="http://schemas.microsoft.com/office/drawing/2014/main" id="{854EA74E-3EB5-4F66-B2EF-A3E94CFA26EE}"/>
+              </a:ext>
+            </a:extLst>
+          </p:cNvPr>
+          <p:cNvSpPr>
+            <a:spLocks noGrp="1"/>
+          </p:cNvSpPr>
+          <p:nvPr>
+            <p:ph type="title"/>
+          </p:nvPr>
+        </p:nvSpPr>
+        <p:spPr>
+          <a:xfrm>
+            <a:off x="838200" y="212725"/>
+            <a:ext cx="10515600" cy="781885"/>
+          </a:xfrm>
+        </p:spPr>
+        <p:txBody>
+          <a:bodyPr>
+            <a:normAutofit/>
+          </a:bodyPr>
+          <a:lstStyle/>
+          <a:p>
+            <a:r>
+              <a:rPr lang="en-US" sz="3200" dirty="0"/>
+              <a:t>Adding a new tax function (3)</a:t>
+            </a:r>
+          </a:p>
+        </p:txBody>
+      </p:sp>
+      <p:sp>
+        <p:nvSpPr>
+          <p:cNvPr id="3" name="Content Placeholder 2">
+            <a:extLst>
+              <a:ext uri="{FF2B5EF4-FFF2-40B4-BE49-F238E27FC236}">
+                <a16:creationId xmlns:a16="http://schemas.microsoft.com/office/drawing/2014/main" id="{D4AB1FC9-D5D0-47B6-B0D8-8E05DE7437CE}"/>
+              </a:ext>
+            </a:extLst>
+          </p:cNvPr>
+          <p:cNvSpPr>
+            <a:spLocks noGrp="1"/>
+          </p:cNvSpPr>
+          <p:nvPr>
+            <p:ph idx="1"/>
+          </p:nvPr>
+        </p:nvSpPr>
+        <p:spPr>
+          <a:xfrm>
+            <a:off x="838200" y="994611"/>
+            <a:ext cx="10515600" cy="5182352"/>
+          </a:xfrm>
+        </p:spPr>
+        <p:txBody>
+          <a:bodyPr/>
+          <a:lstStyle/>
+          <a:p>
+            <a:r>
+              <a:rPr lang="en-US" sz="2000" dirty="0"/>
+              <a:t>Connect the new function with the calculator.</a:t>
+            </a:r>
+          </a:p>
+          <a:p>
+            <a:r>
+              <a:rPr lang="en-US" sz="2000" dirty="0"/>
+              <a:t>This is done by updating </a:t>
+            </a:r>
+            <a:r>
+              <a:rPr lang="en-US" sz="2000" b="1" dirty="0"/>
+              <a:t>calculator.py </a:t>
+            </a:r>
+            <a:r>
+              <a:rPr lang="en-US" sz="2000" dirty="0"/>
+              <a:t>in two places.</a:t>
+            </a:r>
+          </a:p>
+          <a:p>
+            <a:pPr lvl="1"/>
+            <a:r>
+              <a:rPr lang="en-US" dirty="0"/>
+              <a:t>At the beginning where we import it and,</a:t>
+            </a:r>
+          </a:p>
+          <a:p>
+            <a:pPr lvl="1"/>
+            <a:r>
+              <a:rPr lang="en-US" dirty="0"/>
+              <a:t>In </a:t>
+            </a:r>
+            <a:r>
+              <a:rPr lang="en-US" dirty="0" err="1"/>
+              <a:t>calc_all</a:t>
+            </a:r>
+            <a:r>
+              <a:rPr lang="en-US" dirty="0"/>
+              <a:t> function where we call the function. </a:t>
+            </a:r>
+          </a:p>
+        </p:txBody>
+      </p:sp>
+      <p:pic>
+        <p:nvPicPr>
+          <p:cNvPr id="4" name="Picture 3">
+            <a:extLst>
+              <a:ext uri="{FF2B5EF4-FFF2-40B4-BE49-F238E27FC236}">
+                <a16:creationId xmlns:a16="http://schemas.microsoft.com/office/drawing/2014/main" id="{64F7468D-23E2-48B7-A0EC-DC83030AE4EE}"/>
+              </a:ext>
+            </a:extLst>
+          </p:cNvPr>
+          <p:cNvPicPr/>
+          <p:nvPr/>
+        </p:nvPicPr>
+        <p:blipFill>
+          <a:blip r:embed="rId2"/>
+          <a:stretch>
+            <a:fillRect/>
+          </a:stretch>
+        </p:blipFill>
+        <p:spPr>
+          <a:xfrm>
+            <a:off x="1640307" y="2663238"/>
+            <a:ext cx="4665243" cy="3513724"/>
+          </a:xfrm>
+          <a:prstGeom prst="rect">
+            <a:avLst/>
+          </a:prstGeom>
+        </p:spPr>
+      </p:pic>
+      <p:pic>
+        <p:nvPicPr>
+          <p:cNvPr id="5" name="Picture 4">
+            <a:extLst>
+              <a:ext uri="{FF2B5EF4-FFF2-40B4-BE49-F238E27FC236}">
+                <a16:creationId xmlns:a16="http://schemas.microsoft.com/office/drawing/2014/main" id="{842D2896-C241-4B64-9F15-5DA3ABBC1AE2}"/>
+              </a:ext>
+            </a:extLst>
+          </p:cNvPr>
+          <p:cNvPicPr/>
+          <p:nvPr/>
+        </p:nvPicPr>
+        <p:blipFill>
+          <a:blip r:embed="rId3"/>
+          <a:stretch>
+            <a:fillRect/>
+          </a:stretch>
+        </p:blipFill>
+        <p:spPr>
+          <a:xfrm>
+            <a:off x="7796464" y="1032627"/>
+            <a:ext cx="3958390" cy="5144335"/>
+          </a:xfrm>
+          <a:prstGeom prst="rect">
+            <a:avLst/>
+          </a:prstGeom>
+        </p:spPr>
+      </p:pic>
+      <p:sp>
+        <p:nvSpPr>
+          <p:cNvPr id="6" name="TextBox 5">
+            <a:extLst>
+              <a:ext uri="{FF2B5EF4-FFF2-40B4-BE49-F238E27FC236}">
+                <a16:creationId xmlns:a16="http://schemas.microsoft.com/office/drawing/2014/main" id="{194B03CD-8EFB-40CA-AEC3-620F36956DD7}"/>
+              </a:ext>
+            </a:extLst>
+          </p:cNvPr>
+          <p:cNvSpPr txBox="1"/>
+          <p:nvPr/>
+        </p:nvSpPr>
+        <p:spPr>
+          <a:xfrm>
+            <a:off x="561474" y="6304549"/>
+            <a:ext cx="10515600" cy="584775"/>
+          </a:xfrm>
+          <a:prstGeom prst="rect">
+            <a:avLst/>
+          </a:prstGeom>
+          <a:noFill/>
+        </p:spPr>
+        <p:txBody>
+          <a:bodyPr wrap="square" rtlCol="0">
+            <a:spAutoFit/>
+          </a:bodyPr>
+          <a:lstStyle/>
+          <a:p>
+            <a:r>
+              <a:rPr lang="en-US" sz="1600" b="1" dirty="0"/>
+              <a:t>Note:</a:t>
+            </a:r>
+            <a:r>
+              <a:rPr lang="en-US" sz="1600" dirty="0"/>
+              <a:t> The declaration in </a:t>
+            </a:r>
+            <a:r>
+              <a:rPr lang="en-US" sz="1600" dirty="0" err="1"/>
+              <a:t>calc_all</a:t>
+            </a:r>
+            <a:r>
+              <a:rPr lang="en-US" sz="1600" dirty="0"/>
+              <a:t> function looks for “</a:t>
+            </a:r>
+            <a:r>
+              <a:rPr lang="en-US" sz="1600" dirty="0" err="1"/>
+              <a:t>self.__policy</a:t>
+            </a:r>
+            <a:r>
+              <a:rPr lang="en-US" sz="1600" dirty="0"/>
+              <a:t>” variables and “</a:t>
+            </a:r>
+            <a:r>
+              <a:rPr lang="en-US" sz="1600" dirty="0" err="1"/>
+              <a:t>self.__records</a:t>
+            </a:r>
+            <a:r>
+              <a:rPr lang="en-US" sz="1600" dirty="0"/>
+              <a:t>” variables hence the order of the input variables declared in the functions.py has to be in the same order – policy and then record variables.</a:t>
+            </a:r>
+          </a:p>
+        </p:txBody>
+      </p:sp>
+      <p:sp>
+        <p:nvSpPr>
+          <p:cNvPr id="8" name="Oval 7">
+            <a:extLst>
+              <a:ext uri="{FF2B5EF4-FFF2-40B4-BE49-F238E27FC236}">
+                <a16:creationId xmlns:a16="http://schemas.microsoft.com/office/drawing/2014/main" id="{419D10E6-B588-4359-8BE9-672D180821E2}"/>
+              </a:ext>
+            </a:extLst>
+          </p:cNvPr>
+          <p:cNvSpPr/>
+          <p:nvPr/>
+        </p:nvSpPr>
+        <p:spPr>
+          <a:xfrm>
+            <a:off x="4523873" y="3487153"/>
+            <a:ext cx="1780674" cy="324853"/>
+          </a:xfrm>
+          <a:prstGeom prst="ellipse">
+            <a:avLst/>
+          </a:prstGeom>
+          <a:noFill/>
+        </p:spPr>
+        <p:style>
+          <a:lnRef idx="2">
+            <a:schemeClr val="accent1">
+              <a:shade val="50000"/>
+            </a:schemeClr>
+          </a:lnRef>
+          <a:fillRef idx="1">
+            <a:schemeClr val="accent1"/>
+          </a:fillRef>
+          <a:effectRef idx="0">
+            <a:schemeClr val="accent1"/>
+          </a:effectRef>
+          <a:fontRef idx="minor">
+            <a:schemeClr val="lt1"/>
+          </a:fontRef>
+        </p:style>
+        <p:txBody>
+          <a:bodyPr rtlCol="0" anchor="ctr"/>
+          <a:lstStyle/>
+          <a:p>
+            <a:pPr algn="ctr"/>
+            <a:endParaRPr lang="en-US"/>
+          </a:p>
+        </p:txBody>
+      </p:sp>
+      <p:sp>
+        <p:nvSpPr>
+          <p:cNvPr id="9" name="Oval 8">
+            <a:extLst>
+              <a:ext uri="{FF2B5EF4-FFF2-40B4-BE49-F238E27FC236}">
+                <a16:creationId xmlns:a16="http://schemas.microsoft.com/office/drawing/2014/main" id="{193812AB-0966-47D7-A41F-3754721E60E7}"/>
+              </a:ext>
+            </a:extLst>
+          </p:cNvPr>
+          <p:cNvSpPr/>
+          <p:nvPr/>
+        </p:nvSpPr>
+        <p:spPr>
+          <a:xfrm>
+            <a:off x="7395411" y="4420100"/>
+            <a:ext cx="3958389" cy="322848"/>
+          </a:xfrm>
+          <a:prstGeom prst="ellipse">
+            <a:avLst/>
+          </a:prstGeom>
+          <a:noFill/>
+        </p:spPr>
+        <p:style>
+          <a:lnRef idx="2">
+            <a:schemeClr val="accent1">
+              <a:shade val="50000"/>
+            </a:schemeClr>
+          </a:lnRef>
+          <a:fillRef idx="1">
+            <a:schemeClr val="accent1"/>
+          </a:fillRef>
+          <a:effectRef idx="0">
+            <a:schemeClr val="accent1"/>
+          </a:effectRef>
+          <a:fontRef idx="minor">
+            <a:schemeClr val="lt1"/>
+          </a:fontRef>
+        </p:style>
+        <p:txBody>
+          <a:bodyPr rtlCol="0" anchor="ctr"/>
+          <a:lstStyle/>
+          <a:p>
+            <a:pPr algn="ctr"/>
+            <a:endParaRPr lang="en-US"/>
+          </a:p>
+        </p:txBody>
+      </p:sp>
+    </p:spTree>
+    <p:extLst>
+      <p:ext uri="{BB962C8B-B14F-4D97-AF65-F5344CB8AC3E}">
+        <p14:creationId xmlns:p14="http://schemas.microsoft.com/office/powerpoint/2010/main" val="1313210503"/>
+      </p:ext>
+    </p:extLst>
+  </p:cSld>
+  <p:clrMapOvr>
+    <a:masterClrMapping/>
+  </p:clrMapOvr>
+</p:sld>
+</file>
+
+<file path=ppt/slides/slide31.xml><?xml version="1.0" encoding="utf-8"?>
+<p:sld xmlns:a="http://schemas.openxmlformats.org/drawingml/2006/main" xmlns:r="http://schemas.openxmlformats.org/officeDocument/2006/relationships" xmlns:p="http://schemas.openxmlformats.org/presentationml/2006/main">
+  <p:cSld>
+    <p:spTree>
+      <p:nvGrpSpPr>
+        <p:cNvPr id="1" name=""/>
+        <p:cNvGrpSpPr/>
+        <p:nvPr/>
+      </p:nvGrpSpPr>
+      <p:grpSpPr>
+        <a:xfrm>
+          <a:off x="0" y="0"/>
+          <a:ext cx="0" cy="0"/>
+          <a:chOff x="0" y="0"/>
+          <a:chExt cx="0" cy="0"/>
+        </a:xfrm>
+      </p:grpSpPr>
+      <p:sp>
+        <p:nvSpPr>
+          <p:cNvPr id="2" name="Title 1">
+            <a:extLst>
+              <a:ext uri="{FF2B5EF4-FFF2-40B4-BE49-F238E27FC236}">
                 <a16:creationId xmlns:a16="http://schemas.microsoft.com/office/drawing/2014/main" id="{48131AAD-9007-4C88-8B58-80D4A9F9FF82}"/>
               </a:ext>
             </a:extLst>
@@ -20383,15 +20579,7 @@
           <a:p>
             <a:r>
               <a:rPr lang="en-US" sz="2000" dirty="0"/>
-              <a:t>“INCOME_HP” and “</a:t>
-            </a:r>
-            <a:r>
-              <a:rPr lang="en-US" sz="2000" dirty="0" err="1"/>
-              <a:t>Income_House_Property</a:t>
-            </a:r>
-            <a:r>
-              <a:rPr lang="en-US" sz="2000" dirty="0"/>
-              <a:t>” are declared in </a:t>
+              <a:t>“INCOME_HP” and “Income_House_Property” are declared in </a:t>
             </a:r>
             <a:r>
               <a:rPr lang="en-US" sz="2000" dirty="0" err="1"/>
@@ -20399,15 +20587,7 @@
             </a:r>
             <a:r>
               <a:rPr lang="en-US" sz="2000" dirty="0"/>
-              <a:t>. “INCOME_HP” is declared as a “read” variable as it is directly read from the tax return/survey while “</a:t>
-            </a:r>
-            <a:r>
-              <a:rPr lang="en-US" sz="2000" dirty="0" err="1"/>
-              <a:t>Income_House_Property</a:t>
-            </a:r>
-            <a:r>
-              <a:rPr lang="en-US" sz="2000" dirty="0"/>
-              <a:t>” is declared as a “calc” (calculated) variable.</a:t>
+              <a:t>. “INCOME_HP” is declared as a “read” variable as it is directly read from the tax return/survey while “Income_House_Property” is declared as a “calc” (calculated) variable.</a:t>
             </a:r>
           </a:p>
           <a:p>
@@ -20581,7 +20761,7 @@
 </p:sld>
 </file>
 
-<file path=ppt/slides/slide31.xml><?xml version="1.0" encoding="utf-8"?>
+<file path=ppt/slides/slide32.xml><?xml version="1.0" encoding="utf-8"?>
 <p:sld xmlns:a="http://schemas.openxmlformats.org/drawingml/2006/main" xmlns:r="http://schemas.openxmlformats.org/officeDocument/2006/relationships" xmlns:p="http://schemas.openxmlformats.org/presentationml/2006/main">
   <p:cSld>
     <p:spTree>
@@ -20712,7 +20892,7 @@
           <a:p>
             <a:fld id="{52C44A77-5F5E-4CB9-8D56-F5EB4797E63D}" type="slidenum">
               <a:rPr lang="en-US" smtClean="0"/>
-              <a:t>31</a:t>
+              <a:t>32</a:t>
             </a:fld>
             <a:endParaRPr lang="en-US"/>
           </a:p>
@@ -20759,7 +20939,7 @@
 </p:sld>
 </file>
 
-<file path=ppt/slides/slide32.xml><?xml version="1.0" encoding="utf-8"?>
+<file path=ppt/slides/slide33.xml><?xml version="1.0" encoding="utf-8"?>
 <p:sld xmlns:a="http://schemas.openxmlformats.org/drawingml/2006/main" xmlns:r="http://schemas.openxmlformats.org/officeDocument/2006/relationships" xmlns:p="http://schemas.openxmlformats.org/presentationml/2006/main">
   <p:cSld>
     <p:spTree>
@@ -20985,7 +21165,7 @@
 </p:sld>
 </file>
 
-<file path=ppt/slides/slide33.xml><?xml version="1.0" encoding="utf-8"?>
+<file path=ppt/slides/slide34.xml><?xml version="1.0" encoding="utf-8"?>
 <p:sld xmlns:a="http://schemas.openxmlformats.org/drawingml/2006/main" xmlns:r="http://schemas.openxmlformats.org/officeDocument/2006/relationships" xmlns:p="http://schemas.openxmlformats.org/presentationml/2006/main">
   <p:cSld>
     <p:spTree>
@@ -21163,7 +21343,7 @@
           <a:p>
             <a:fld id="{52C44A77-5F5E-4CB9-8D56-F5EB4797E63D}" type="slidenum">
               <a:rPr lang="en-US" smtClean="0"/>
-              <a:t>33</a:t>
+              <a:t>34</a:t>
             </a:fld>
             <a:endParaRPr lang="en-US"/>
           </a:p>
@@ -21257,7 +21437,7 @@
 </p:sld>
 </file>
 
-<file path=ppt/slides/slide34.xml><?xml version="1.0" encoding="utf-8"?>
+<file path=ppt/slides/slide35.xml><?xml version="1.0" encoding="utf-8"?>
 <p:sld xmlns:a="http://schemas.openxmlformats.org/drawingml/2006/main" xmlns:r="http://schemas.openxmlformats.org/officeDocument/2006/relationships" xmlns:p="http://schemas.openxmlformats.org/presentationml/2006/main">
   <p:cSld>
     <p:spTree>
@@ -21480,7 +21660,7 @@
 </p:sld>
 </file>
 
-<file path=ppt/slides/slide35.xml><?xml version="1.0" encoding="utf-8"?>
+<file path=ppt/slides/slide36.xml><?xml version="1.0" encoding="utf-8"?>
 <p:sld xmlns:a="http://schemas.openxmlformats.org/drawingml/2006/main" xmlns:r="http://schemas.openxmlformats.org/officeDocument/2006/relationships" xmlns:p="http://schemas.openxmlformats.org/presentationml/2006/main">
   <p:cSld>
     <p:spTree>
@@ -21612,7 +21792,7 @@
           <a:p>
             <a:fld id="{52C44A77-5F5E-4CB9-8D56-F5EB4797E63D}" type="slidenum">
               <a:rPr lang="en-US" smtClean="0"/>
-              <a:t>35</a:t>
+              <a:t>36</a:t>
             </a:fld>
             <a:endParaRPr lang="en-US"/>
           </a:p>
@@ -22394,7 +22574,7 @@
 </p:sld>
 </file>
 
-<file path=ppt/slides/slide36.xml><?xml version="1.0" encoding="utf-8"?>
+<file path=ppt/slides/slide37.xml><?xml version="1.0" encoding="utf-8"?>
 <p:sld xmlns:a="http://schemas.openxmlformats.org/drawingml/2006/main" xmlns:r="http://schemas.openxmlformats.org/officeDocument/2006/relationships" xmlns:p="http://schemas.openxmlformats.org/presentationml/2006/main">
   <p:cSld>
     <p:spTree>
@@ -23530,7 +23710,7 @@
 </p:sld>
 </file>
 
-<file path=ppt/slides/slide37.xml><?xml version="1.0" encoding="utf-8"?>
+<file path=ppt/slides/slide38.xml><?xml version="1.0" encoding="utf-8"?>
 <p:sld xmlns:a="http://schemas.openxmlformats.org/drawingml/2006/main" xmlns:r="http://schemas.openxmlformats.org/officeDocument/2006/relationships" xmlns:p="http://schemas.openxmlformats.org/presentationml/2006/main">
   <p:cSld>
     <p:spTree>
@@ -23837,7 +24017,7 @@
 </p:sld>
 </file>
 
-<file path=ppt/slides/slide38.xml><?xml version="1.0" encoding="utf-8"?>
+<file path=ppt/slides/slide39.xml><?xml version="1.0" encoding="utf-8"?>
 <p:sld xmlns:a="http://schemas.openxmlformats.org/drawingml/2006/main" xmlns:r="http://schemas.openxmlformats.org/officeDocument/2006/relationships" xmlns:p="http://schemas.openxmlformats.org/presentationml/2006/main">
   <p:cSld>
     <p:spTree>
@@ -24542,7 +24722,285 @@
 </p:sld>
 </file>
 
-<file path=ppt/slides/slide39.xml><?xml version="1.0" encoding="utf-8"?>
+<file path=ppt/slides/slide4.xml><?xml version="1.0" encoding="utf-8"?>
+<p:sld xmlns:a="http://schemas.openxmlformats.org/drawingml/2006/main" xmlns:r="http://schemas.openxmlformats.org/officeDocument/2006/relationships" xmlns:p="http://schemas.openxmlformats.org/presentationml/2006/main">
+  <p:cSld>
+    <p:bg>
+      <p:bgPr>
+        <a:solidFill>
+          <a:schemeClr val="bg1"/>
+        </a:solidFill>
+        <a:effectLst/>
+      </p:bgPr>
+    </p:bg>
+    <p:spTree>
+      <p:nvGrpSpPr>
+        <p:cNvPr id="1" name=""/>
+        <p:cNvGrpSpPr/>
+        <p:nvPr/>
+      </p:nvGrpSpPr>
+      <p:grpSpPr>
+        <a:xfrm>
+          <a:off x="0" y="0"/>
+          <a:ext cx="0" cy="0"/>
+          <a:chOff x="0" y="0"/>
+          <a:chExt cx="0" cy="0"/>
+        </a:xfrm>
+      </p:grpSpPr>
+      <p:sp>
+        <p:nvSpPr>
+          <p:cNvPr id="2" name="Title 1">
+            <a:extLst>
+              <a:ext uri="{FF2B5EF4-FFF2-40B4-BE49-F238E27FC236}">
+                <a16:creationId xmlns:a16="http://schemas.microsoft.com/office/drawing/2014/main" id="{06D5549D-75DA-4CC8-816A-FEDB28FD56A1}"/>
+              </a:ext>
+            </a:extLst>
+          </p:cNvPr>
+          <p:cNvSpPr>
+            <a:spLocks noGrp="1"/>
+          </p:cNvSpPr>
+          <p:nvPr>
+            <p:ph type="title"/>
+          </p:nvPr>
+        </p:nvSpPr>
+        <p:spPr>
+          <a:xfrm>
+            <a:off x="2662518" y="188258"/>
+            <a:ext cx="7117975" cy="485489"/>
+          </a:xfrm>
+        </p:spPr>
+        <p:txBody>
+          <a:bodyPr>
+            <a:normAutofit fontScale="90000"/>
+          </a:bodyPr>
+          <a:lstStyle/>
+          <a:p>
+            <a:pPr algn="ctr"/>
+            <a:br>
+              <a:rPr lang="en-US" sz="3600" dirty="0"/>
+            </a:br>
+            <a:r>
+              <a:rPr lang="en-US" sz="3600" dirty="0"/>
+              <a:t>What Are The Key Inputs To The Model?</a:t>
+            </a:r>
+            <a:br>
+              <a:rPr lang="en-US" sz="2000" dirty="0"/>
+            </a:br>
+            <a:endParaRPr lang="en-US" sz="2000" dirty="0"/>
+          </a:p>
+        </p:txBody>
+      </p:sp>
+      <p:sp>
+        <p:nvSpPr>
+          <p:cNvPr id="3" name="Content Placeholder 2">
+            <a:extLst>
+              <a:ext uri="{FF2B5EF4-FFF2-40B4-BE49-F238E27FC236}">
+                <a16:creationId xmlns:a16="http://schemas.microsoft.com/office/drawing/2014/main" id="{F4506083-C3B1-47B8-A7F6-BD4013761D40}"/>
+              </a:ext>
+            </a:extLst>
+          </p:cNvPr>
+          <p:cNvSpPr>
+            <a:spLocks noGrp="1"/>
+          </p:cNvSpPr>
+          <p:nvPr>
+            <p:ph sz="quarter" idx="13"/>
+          </p:nvPr>
+        </p:nvSpPr>
+        <p:spPr>
+          <a:xfrm>
+            <a:off x="5988424" y="846270"/>
+            <a:ext cx="5516495" cy="5375236"/>
+          </a:xfrm>
+        </p:spPr>
+        <p:txBody>
+          <a:bodyPr>
+            <a:normAutofit/>
+          </a:bodyPr>
+          <a:lstStyle/>
+          <a:p>
+            <a:pPr lvl="1"/>
+            <a:r>
+              <a:rPr lang="en-US" sz="1600" dirty="0"/>
+              <a:t>Data collection</a:t>
+            </a:r>
+          </a:p>
+          <a:p>
+            <a:pPr lvl="2"/>
+            <a:r>
+              <a:rPr lang="en-US" sz="1400" dirty="0"/>
+              <a:t>the weighted sample  should simulate the  population DATA of country’s tax return forms.</a:t>
+            </a:r>
+          </a:p>
+          <a:p>
+            <a:pPr lvl="2"/>
+            <a:r>
+              <a:rPr lang="en-US" sz="1400" dirty="0"/>
+              <a:t>The stratified sample size should depend on the variance in the population data. </a:t>
+            </a:r>
+          </a:p>
+          <a:p>
+            <a:pPr lvl="2"/>
+            <a:r>
+              <a:rPr lang="en-US" sz="1400" dirty="0"/>
+              <a:t>The entire set of data records are not needed. </a:t>
+            </a:r>
+          </a:p>
+          <a:p>
+            <a:pPr lvl="2"/>
+            <a:r>
+              <a:rPr lang="en-US" sz="1400" dirty="0"/>
+              <a:t>A good sample size is close to the tax logic of the country.</a:t>
+            </a:r>
+          </a:p>
+          <a:p>
+            <a:pPr lvl="2"/>
+            <a:r>
+              <a:rPr lang="en-US" sz="1400" dirty="0"/>
+              <a:t>you also need to determine the rate at which the variables in the data are growing for future projections. </a:t>
+            </a:r>
+          </a:p>
+          <a:p>
+            <a:pPr lvl="2"/>
+            <a:r>
+              <a:rPr lang="en-US" sz="1400" dirty="0"/>
+              <a:t>The variables’ growth rate can depend on the logic you apply to the specific variables, for e.g. it could be GDP growth rates, salary growth rate or income house salary growth rate depending on the rationale of the variable.</a:t>
+            </a:r>
+          </a:p>
+          <a:p>
+            <a:pPr lvl="1"/>
+            <a:r>
+              <a:rPr lang="en-US" sz="1600" dirty="0"/>
+              <a:t>Records Module</a:t>
+            </a:r>
+          </a:p>
+          <a:p>
+            <a:pPr lvl="2"/>
+            <a:r>
+              <a:rPr lang="en-US" sz="1400" dirty="0"/>
+              <a:t>Tax Return information</a:t>
+            </a:r>
+          </a:p>
+          <a:p>
+            <a:pPr lvl="2"/>
+            <a:r>
+              <a:rPr lang="en-US" sz="1400" dirty="0"/>
+              <a:t>Data preparation including weights</a:t>
+            </a:r>
+          </a:p>
+          <a:p>
+            <a:pPr lvl="2"/>
+            <a:r>
+              <a:rPr lang="en-US" sz="1400" dirty="0"/>
+              <a:t>Data description</a:t>
+            </a:r>
+          </a:p>
+          <a:p>
+            <a:pPr lvl="1"/>
+            <a:r>
+              <a:rPr lang="en-US" sz="1600" dirty="0"/>
+              <a:t>Policy Module (and Policy Reform)</a:t>
+            </a:r>
+          </a:p>
+          <a:p>
+            <a:pPr lvl="1"/>
+            <a:r>
+              <a:rPr lang="en-US" sz="1600" dirty="0"/>
+              <a:t>Calculator Module (and Tax Functions)</a:t>
+            </a:r>
+          </a:p>
+          <a:p>
+            <a:pPr lvl="1"/>
+            <a:r>
+              <a:rPr lang="en-US" sz="1600" dirty="0"/>
+              <a:t>Grow Factors Module</a:t>
+            </a:r>
+          </a:p>
+          <a:p>
+            <a:pPr lvl="1"/>
+            <a:r>
+              <a:rPr lang="en-US" sz="1600" dirty="0"/>
+              <a:t>Applications Module (app0, app1, app2 etc.)</a:t>
+            </a:r>
+          </a:p>
+          <a:p>
+            <a:pPr lvl="2"/>
+            <a:endParaRPr lang="en-US" sz="900" dirty="0"/>
+          </a:p>
+          <a:p>
+            <a:pPr lvl="2"/>
+            <a:endParaRPr lang="en-US" sz="900" dirty="0"/>
+          </a:p>
+          <a:p>
+            <a:pPr lvl="2"/>
+            <a:endParaRPr lang="en-US" sz="900" dirty="0"/>
+          </a:p>
+          <a:p>
+            <a:endParaRPr lang="en-US" sz="900" dirty="0"/>
+          </a:p>
+        </p:txBody>
+      </p:sp>
+      <p:pic>
+        <p:nvPicPr>
+          <p:cNvPr id="5" name="Content Placeholder 9" descr="A close up of electronics&#10;&#10;Description automatically generated">
+            <a:extLst>
+              <a:ext uri="{FF2B5EF4-FFF2-40B4-BE49-F238E27FC236}">
+                <a16:creationId xmlns:a16="http://schemas.microsoft.com/office/drawing/2014/main" id="{482CEDD2-A0D6-4D3D-A252-5264A5C4A4EC}"/>
+              </a:ext>
+            </a:extLst>
+          </p:cNvPr>
+          <p:cNvPicPr>
+            <a:picLocks noChangeAspect="1"/>
+          </p:cNvPicPr>
+          <p:nvPr/>
+        </p:nvPicPr>
+        <p:blipFill>
+          <a:blip r:embed="rId2">
+            <a:extLst>
+              <a:ext uri="{28A0092B-C50C-407E-A947-70E740481C1C}">
+                <a14:useLocalDpi xmlns:a14="http://schemas.microsoft.com/office/drawing/2010/main" val="0"/>
+              </a:ext>
+            </a:extLst>
+          </a:blip>
+          <a:stretch>
+            <a:fillRect/>
+          </a:stretch>
+        </p:blipFill>
+        <p:spPr>
+          <a:xfrm>
+            <a:off x="557303" y="1147548"/>
+            <a:ext cx="5090461" cy="4299472"/>
+          </a:xfrm>
+          <a:prstGeom prst="rect">
+            <a:avLst/>
+          </a:prstGeom>
+          <a:scene3d>
+            <a:camera prst="orthographicFront"/>
+            <a:lightRig rig="threePt" dir="t">
+              <a:rot lat="0" lon="0" rev="2700000"/>
+            </a:lightRig>
+          </a:scene3d>
+          <a:sp3d contourW="6350">
+            <a:bevelT h="38100"/>
+            <a:contourClr>
+              <a:srgbClr val="C0C0C0"/>
+            </a:contourClr>
+          </a:sp3d>
+        </p:spPr>
+      </p:pic>
+    </p:spTree>
+    <p:extLst>
+      <p:ext uri="{BB962C8B-B14F-4D97-AF65-F5344CB8AC3E}">
+        <p14:creationId xmlns:p14="http://schemas.microsoft.com/office/powerpoint/2010/main" val="109466180"/>
+      </p:ext>
+    </p:extLst>
+  </p:cSld>
+  <p:clrMapOvr>
+    <a:masterClrMapping/>
+  </p:clrMapOvr>
+</p:sld>
+</file>
+
+<file path=ppt/slides/slide40.xml><?xml version="1.0" encoding="utf-8"?>
 <p:sld xmlns:a="http://schemas.openxmlformats.org/drawingml/2006/main" xmlns:r="http://schemas.openxmlformats.org/officeDocument/2006/relationships" xmlns:p="http://schemas.openxmlformats.org/presentationml/2006/main">
   <p:cSld>
     <p:bg>
@@ -24683,7 +25141,7 @@
                   <a:spcPts val="600"/>
                 </a:spcAft>
               </a:pPr>
-              <a:t>39</a:t>
+              <a:t>40</a:t>
             </a:fld>
             <a:endParaRPr lang="en-US"/>
           </a:p>
@@ -24702,285 +25160,7 @@
 </p:sld>
 </file>
 
-<file path=ppt/slides/slide4.xml><?xml version="1.0" encoding="utf-8"?>
-<p:sld xmlns:a="http://schemas.openxmlformats.org/drawingml/2006/main" xmlns:r="http://schemas.openxmlformats.org/officeDocument/2006/relationships" xmlns:p="http://schemas.openxmlformats.org/presentationml/2006/main">
-  <p:cSld>
-    <p:bg>
-      <p:bgPr>
-        <a:solidFill>
-          <a:schemeClr val="bg1"/>
-        </a:solidFill>
-        <a:effectLst/>
-      </p:bgPr>
-    </p:bg>
-    <p:spTree>
-      <p:nvGrpSpPr>
-        <p:cNvPr id="1" name=""/>
-        <p:cNvGrpSpPr/>
-        <p:nvPr/>
-      </p:nvGrpSpPr>
-      <p:grpSpPr>
-        <a:xfrm>
-          <a:off x="0" y="0"/>
-          <a:ext cx="0" cy="0"/>
-          <a:chOff x="0" y="0"/>
-          <a:chExt cx="0" cy="0"/>
-        </a:xfrm>
-      </p:grpSpPr>
-      <p:sp>
-        <p:nvSpPr>
-          <p:cNvPr id="2" name="Title 1">
-            <a:extLst>
-              <a:ext uri="{FF2B5EF4-FFF2-40B4-BE49-F238E27FC236}">
-                <a16:creationId xmlns:a16="http://schemas.microsoft.com/office/drawing/2014/main" id="{06D5549D-75DA-4CC8-816A-FEDB28FD56A1}"/>
-              </a:ext>
-            </a:extLst>
-          </p:cNvPr>
-          <p:cNvSpPr>
-            <a:spLocks noGrp="1"/>
-          </p:cNvSpPr>
-          <p:nvPr>
-            <p:ph type="title"/>
-          </p:nvPr>
-        </p:nvSpPr>
-        <p:spPr>
-          <a:xfrm>
-            <a:off x="2662518" y="188258"/>
-            <a:ext cx="7117975" cy="485489"/>
-          </a:xfrm>
-        </p:spPr>
-        <p:txBody>
-          <a:bodyPr>
-            <a:normAutofit fontScale="90000"/>
-          </a:bodyPr>
-          <a:lstStyle/>
-          <a:p>
-            <a:pPr algn="ctr"/>
-            <a:br>
-              <a:rPr lang="en-US" sz="3600" dirty="0"/>
-            </a:br>
-            <a:r>
-              <a:rPr lang="en-US" sz="3600" dirty="0"/>
-              <a:t>What Are The Key Inputs To The Model?</a:t>
-            </a:r>
-            <a:br>
-              <a:rPr lang="en-US" sz="2000" dirty="0"/>
-            </a:br>
-            <a:endParaRPr lang="en-US" sz="2000" dirty="0"/>
-          </a:p>
-        </p:txBody>
-      </p:sp>
-      <p:sp>
-        <p:nvSpPr>
-          <p:cNvPr id="3" name="Content Placeholder 2">
-            <a:extLst>
-              <a:ext uri="{FF2B5EF4-FFF2-40B4-BE49-F238E27FC236}">
-                <a16:creationId xmlns:a16="http://schemas.microsoft.com/office/drawing/2014/main" id="{F4506083-C3B1-47B8-A7F6-BD4013761D40}"/>
-              </a:ext>
-            </a:extLst>
-          </p:cNvPr>
-          <p:cNvSpPr>
-            <a:spLocks noGrp="1"/>
-          </p:cNvSpPr>
-          <p:nvPr>
-            <p:ph sz="quarter" idx="13"/>
-          </p:nvPr>
-        </p:nvSpPr>
-        <p:spPr>
-          <a:xfrm>
-            <a:off x="5988424" y="846270"/>
-            <a:ext cx="5516495" cy="5375236"/>
-          </a:xfrm>
-        </p:spPr>
-        <p:txBody>
-          <a:bodyPr>
-            <a:normAutofit/>
-          </a:bodyPr>
-          <a:lstStyle/>
-          <a:p>
-            <a:pPr lvl="1"/>
-            <a:r>
-              <a:rPr lang="en-US" sz="1600" dirty="0"/>
-              <a:t>Data collection</a:t>
-            </a:r>
-          </a:p>
-          <a:p>
-            <a:pPr lvl="2"/>
-            <a:r>
-              <a:rPr lang="en-US" sz="1400" dirty="0"/>
-              <a:t>the weighted sample  should simulate the  population DATA of country’s tax return forms.</a:t>
-            </a:r>
-          </a:p>
-          <a:p>
-            <a:pPr lvl="2"/>
-            <a:r>
-              <a:rPr lang="en-US" sz="1400" dirty="0"/>
-              <a:t>The stratified sample size should depend on the variance in the population data. </a:t>
-            </a:r>
-          </a:p>
-          <a:p>
-            <a:pPr lvl="2"/>
-            <a:r>
-              <a:rPr lang="en-US" sz="1400" dirty="0"/>
-              <a:t>The entire set of data records are not needed. </a:t>
-            </a:r>
-          </a:p>
-          <a:p>
-            <a:pPr lvl="2"/>
-            <a:r>
-              <a:rPr lang="en-US" sz="1400" dirty="0"/>
-              <a:t>A good sample size is close to the tax logic of the country.</a:t>
-            </a:r>
-          </a:p>
-          <a:p>
-            <a:pPr lvl="2"/>
-            <a:r>
-              <a:rPr lang="en-US" sz="1400" dirty="0"/>
-              <a:t>you also need to determine the rate at which the variables in the data are growing for future projections. </a:t>
-            </a:r>
-          </a:p>
-          <a:p>
-            <a:pPr lvl="2"/>
-            <a:r>
-              <a:rPr lang="en-US" sz="1400" dirty="0"/>
-              <a:t>The variables’ growth rate can depend on the logic you apply to the specific variables, for e.g. it could be GDP growth rates, salary growth rate or income house salary growth rate depending on the rationale of the variable.</a:t>
-            </a:r>
-          </a:p>
-          <a:p>
-            <a:pPr lvl="1"/>
-            <a:r>
-              <a:rPr lang="en-US" sz="1600" dirty="0"/>
-              <a:t>Records Module</a:t>
-            </a:r>
-          </a:p>
-          <a:p>
-            <a:pPr lvl="2"/>
-            <a:r>
-              <a:rPr lang="en-US" sz="1400" dirty="0"/>
-              <a:t>Tax Return information</a:t>
-            </a:r>
-          </a:p>
-          <a:p>
-            <a:pPr lvl="2"/>
-            <a:r>
-              <a:rPr lang="en-US" sz="1400" dirty="0"/>
-              <a:t>Data preparation including weights</a:t>
-            </a:r>
-          </a:p>
-          <a:p>
-            <a:pPr lvl="2"/>
-            <a:r>
-              <a:rPr lang="en-US" sz="1400" dirty="0"/>
-              <a:t>Data description</a:t>
-            </a:r>
-          </a:p>
-          <a:p>
-            <a:pPr lvl="1"/>
-            <a:r>
-              <a:rPr lang="en-US" sz="1600" dirty="0"/>
-              <a:t>Policy Module (and Policy Reform)</a:t>
-            </a:r>
-          </a:p>
-          <a:p>
-            <a:pPr lvl="1"/>
-            <a:r>
-              <a:rPr lang="en-US" sz="1600" dirty="0"/>
-              <a:t>Calculator Module (and Tax Functions)</a:t>
-            </a:r>
-          </a:p>
-          <a:p>
-            <a:pPr lvl="1"/>
-            <a:r>
-              <a:rPr lang="en-US" sz="1600" dirty="0"/>
-              <a:t>Grow Factors Module</a:t>
-            </a:r>
-          </a:p>
-          <a:p>
-            <a:pPr lvl="1"/>
-            <a:r>
-              <a:rPr lang="en-US" sz="1600" dirty="0"/>
-              <a:t>Applications Module (app0, app1, app2 etc.)</a:t>
-            </a:r>
-          </a:p>
-          <a:p>
-            <a:pPr lvl="2"/>
-            <a:endParaRPr lang="en-US" sz="900" dirty="0"/>
-          </a:p>
-          <a:p>
-            <a:pPr lvl="2"/>
-            <a:endParaRPr lang="en-US" sz="900" dirty="0"/>
-          </a:p>
-          <a:p>
-            <a:pPr lvl="2"/>
-            <a:endParaRPr lang="en-US" sz="900" dirty="0"/>
-          </a:p>
-          <a:p>
-            <a:endParaRPr lang="en-US" sz="900" dirty="0"/>
-          </a:p>
-        </p:txBody>
-      </p:sp>
-      <p:pic>
-        <p:nvPicPr>
-          <p:cNvPr id="5" name="Content Placeholder 9" descr="A close up of electronics&#10;&#10;Description automatically generated">
-            <a:extLst>
-              <a:ext uri="{FF2B5EF4-FFF2-40B4-BE49-F238E27FC236}">
-                <a16:creationId xmlns:a16="http://schemas.microsoft.com/office/drawing/2014/main" id="{482CEDD2-A0D6-4D3D-A252-5264A5C4A4EC}"/>
-              </a:ext>
-            </a:extLst>
-          </p:cNvPr>
-          <p:cNvPicPr>
-            <a:picLocks noChangeAspect="1"/>
-          </p:cNvPicPr>
-          <p:nvPr/>
-        </p:nvPicPr>
-        <p:blipFill>
-          <a:blip r:embed="rId2">
-            <a:extLst>
-              <a:ext uri="{28A0092B-C50C-407E-A947-70E740481C1C}">
-                <a14:useLocalDpi xmlns:a14="http://schemas.microsoft.com/office/drawing/2010/main" val="0"/>
-              </a:ext>
-            </a:extLst>
-          </a:blip>
-          <a:stretch>
-            <a:fillRect/>
-          </a:stretch>
-        </p:blipFill>
-        <p:spPr>
-          <a:xfrm>
-            <a:off x="557303" y="1147548"/>
-            <a:ext cx="5090461" cy="4299472"/>
-          </a:xfrm>
-          <a:prstGeom prst="rect">
-            <a:avLst/>
-          </a:prstGeom>
-          <a:scene3d>
-            <a:camera prst="orthographicFront"/>
-            <a:lightRig rig="threePt" dir="t">
-              <a:rot lat="0" lon="0" rev="2700000"/>
-            </a:lightRig>
-          </a:scene3d>
-          <a:sp3d contourW="6350">
-            <a:bevelT h="38100"/>
-            <a:contourClr>
-              <a:srgbClr val="C0C0C0"/>
-            </a:contourClr>
-          </a:sp3d>
-        </p:spPr>
-      </p:pic>
-    </p:spTree>
-    <p:extLst>
-      <p:ext uri="{BB962C8B-B14F-4D97-AF65-F5344CB8AC3E}">
-        <p14:creationId xmlns:p14="http://schemas.microsoft.com/office/powerpoint/2010/main" val="109466180"/>
-      </p:ext>
-    </p:extLst>
-  </p:cSld>
-  <p:clrMapOvr>
-    <a:masterClrMapping/>
-  </p:clrMapOvr>
-</p:sld>
-</file>
-
-<file path=ppt/slides/slide40.xml><?xml version="1.0" encoding="utf-8"?>
+<file path=ppt/slides/slide41.xml><?xml version="1.0" encoding="utf-8"?>
 <p:sld xmlns:a="http://schemas.openxmlformats.org/drawingml/2006/main" xmlns:r="http://schemas.openxmlformats.org/officeDocument/2006/relationships" xmlns:p="http://schemas.openxmlformats.org/presentationml/2006/main">
   <p:cSld>
     <p:bg>

</xml_diff>